<commit_message>
Update picas examples and token commands (#21)
* Update README.md

* Update examples

* Add delete and reset tokens instruction

* Update deleteTokens.py

* Added examples/resetTokens.py

* Add screenshot of views

* Update picas-layer.png

* Update local-example.py

* Increase max_token_time for long example
</commit_message>
<xml_diff>
--- a/docs/picas-layers.pptx
+++ b/docs/picas-layers.pptx
@@ -208,7 +208,7 @@
           <a:p>
             <a:fld id="{0460D2EC-8715-7C44-9FCB-D4DD28725C82}" type="datetimeFigureOut">
               <a:rPr lang="en-NL" smtClean="0"/>
-              <a:t>12/10/2023</a:t>
+              <a:t>04/12/2024</a:t>
             </a:fld>
             <a:endParaRPr lang="en-NL"/>
           </a:p>
@@ -709,7 +709,7 @@
           <a:p>
             <a:fld id="{9621D239-4F32-184E-9EBC-A02454901EB4}" type="datetimeFigureOut">
               <a:rPr lang="en-NL" smtClean="0"/>
-              <a:t>12/10/2023</a:t>
+              <a:t>04/12/2024</a:t>
             </a:fld>
             <a:endParaRPr lang="en-NL"/>
           </a:p>
@@ -909,7 +909,7 @@
           <a:p>
             <a:fld id="{9621D239-4F32-184E-9EBC-A02454901EB4}" type="datetimeFigureOut">
               <a:rPr lang="en-NL" smtClean="0"/>
-              <a:t>12/10/2023</a:t>
+              <a:t>04/12/2024</a:t>
             </a:fld>
             <a:endParaRPr lang="en-NL"/>
           </a:p>
@@ -1119,7 +1119,7 @@
           <a:p>
             <a:fld id="{9621D239-4F32-184E-9EBC-A02454901EB4}" type="datetimeFigureOut">
               <a:rPr lang="en-NL" smtClean="0"/>
-              <a:t>12/10/2023</a:t>
+              <a:t>04/12/2024</a:t>
             </a:fld>
             <a:endParaRPr lang="en-NL"/>
           </a:p>
@@ -1319,7 +1319,7 @@
           <a:p>
             <a:fld id="{9621D239-4F32-184E-9EBC-A02454901EB4}" type="datetimeFigureOut">
               <a:rPr lang="en-NL" smtClean="0"/>
-              <a:t>12/10/2023</a:t>
+              <a:t>04/12/2024</a:t>
             </a:fld>
             <a:endParaRPr lang="en-NL"/>
           </a:p>
@@ -1595,7 +1595,7 @@
           <a:p>
             <a:fld id="{9621D239-4F32-184E-9EBC-A02454901EB4}" type="datetimeFigureOut">
               <a:rPr lang="en-NL" smtClean="0"/>
-              <a:t>12/10/2023</a:t>
+              <a:t>04/12/2024</a:t>
             </a:fld>
             <a:endParaRPr lang="en-NL"/>
           </a:p>
@@ -1863,7 +1863,7 @@
           <a:p>
             <a:fld id="{9621D239-4F32-184E-9EBC-A02454901EB4}" type="datetimeFigureOut">
               <a:rPr lang="en-NL" smtClean="0"/>
-              <a:t>12/10/2023</a:t>
+              <a:t>04/12/2024</a:t>
             </a:fld>
             <a:endParaRPr lang="en-NL"/>
           </a:p>
@@ -2278,7 +2278,7 @@
           <a:p>
             <a:fld id="{9621D239-4F32-184E-9EBC-A02454901EB4}" type="datetimeFigureOut">
               <a:rPr lang="en-NL" smtClean="0"/>
-              <a:t>12/10/2023</a:t>
+              <a:t>04/12/2024</a:t>
             </a:fld>
             <a:endParaRPr lang="en-NL"/>
           </a:p>
@@ -2420,7 +2420,7 @@
           <a:p>
             <a:fld id="{9621D239-4F32-184E-9EBC-A02454901EB4}" type="datetimeFigureOut">
               <a:rPr lang="en-NL" smtClean="0"/>
-              <a:t>12/10/2023</a:t>
+              <a:t>04/12/2024</a:t>
             </a:fld>
             <a:endParaRPr lang="en-NL"/>
           </a:p>
@@ -2533,7 +2533,7 @@
           <a:p>
             <a:fld id="{9621D239-4F32-184E-9EBC-A02454901EB4}" type="datetimeFigureOut">
               <a:rPr lang="en-NL" smtClean="0"/>
-              <a:t>12/10/2023</a:t>
+              <a:t>04/12/2024</a:t>
             </a:fld>
             <a:endParaRPr lang="en-NL"/>
           </a:p>
@@ -2846,7 +2846,7 @@
           <a:p>
             <a:fld id="{9621D239-4F32-184E-9EBC-A02454901EB4}" type="datetimeFigureOut">
               <a:rPr lang="en-NL" smtClean="0"/>
-              <a:t>12/10/2023</a:t>
+              <a:t>04/12/2024</a:t>
             </a:fld>
             <a:endParaRPr lang="en-NL"/>
           </a:p>
@@ -3135,7 +3135,7 @@
           <a:p>
             <a:fld id="{9621D239-4F32-184E-9EBC-A02454901EB4}" type="datetimeFigureOut">
               <a:rPr lang="en-NL" smtClean="0"/>
-              <a:t>12/10/2023</a:t>
+              <a:t>04/12/2024</a:t>
             </a:fld>
             <a:endParaRPr lang="en-NL"/>
           </a:p>
@@ -3378,7 +3378,7 @@
           <a:p>
             <a:fld id="{9621D239-4F32-184E-9EBC-A02454901EB4}" type="datetimeFigureOut">
               <a:rPr lang="en-NL" smtClean="0"/>
-              <a:t>12/10/2023</a:t>
+              <a:t>04/12/2024</a:t>
             </a:fld>
             <a:endParaRPr lang="en-NL"/>
           </a:p>
@@ -4247,10 +4247,16 @@
               <a:t>s</a:t>
             </a:r>
             <a:r>
+              <a:rPr lang="en-NL">
+                <a:latin typeface="Avenir Next" panose="020B0503020202020204" pitchFamily="34" charset="0"/>
+              </a:rPr>
+              <a:t>tartpilot</a:t>
+            </a:r>
+            <a:r>
               <a:rPr lang="en-NL" dirty="0">
                 <a:latin typeface="Avenir Next" panose="020B0503020202020204" pitchFamily="34" charset="0"/>
               </a:rPr>
-              <a:t>tart_pilot.sh</a:t>
+              <a:t>.sh</a:t>
             </a:r>
           </a:p>
         </p:txBody>
@@ -4409,10 +4415,10 @@
           <a:p>
             <a:pPr algn="ctr"/>
             <a:r>
-              <a:rPr lang="en-US" dirty="0">
+              <a:rPr lang="en-US">
                 <a:latin typeface="Avenir Next" panose="020B0503020202020204" pitchFamily="34" charset="0"/>
               </a:rPr>
-              <a:t>$ eval $INPUT</a:t>
+              <a:t>bash -c “$INPUT”</a:t>
             </a:r>
             <a:endParaRPr lang="en-NL" dirty="0">
               <a:latin typeface="Avenir Next" panose="020B0503020202020204" pitchFamily="34" charset="0"/>
@@ -4650,7 +4656,7 @@
         <p:spPr>
           <a:xfrm>
             <a:off x="838199" y="1648798"/>
-            <a:ext cx="1827039" cy="369332"/>
+            <a:ext cx="1250663" cy="369332"/>
           </a:xfrm>
           <a:prstGeom prst="rect">
             <a:avLst/>
@@ -4667,7 +4673,7 @@
               <a:rPr lang="en-NL" dirty="0">
                 <a:latin typeface="Avenir Next" panose="020B0503020202020204" pitchFamily="34" charset="0"/>
               </a:rPr>
-              <a:t>Scheduler-layer</a:t>
+              <a:t>Scheduler</a:t>
             </a:r>
           </a:p>
         </p:txBody>
@@ -4687,7 +4693,7 @@
         <p:spPr>
           <a:xfrm>
             <a:off x="838199" y="3839450"/>
-            <a:ext cx="3098862" cy="369332"/>
+            <a:ext cx="3145989" cy="369332"/>
           </a:xfrm>
           <a:prstGeom prst="rect">
             <a:avLst/>
@@ -4704,7 +4710,7 @@
               <a:rPr lang="en-NL" dirty="0">
                 <a:latin typeface="Avenir Next" panose="020B0503020202020204" pitchFamily="34" charset="0"/>
               </a:rPr>
-              <a:t>Picas client: token ingestion</a:t>
+              <a:t>PiCaS client: token ingestion</a:t>
             </a:r>
           </a:p>
         </p:txBody>
@@ -4797,8 +4803,8 @@
         </p:nvSpPr>
         <p:spPr>
           <a:xfrm>
-            <a:off x="838199" y="2739856"/>
-            <a:ext cx="1579278" cy="369332"/>
+            <a:off x="838199" y="2610649"/>
+            <a:ext cx="2843086" cy="646331"/>
           </a:xfrm>
           <a:prstGeom prst="rect">
             <a:avLst/>
@@ -4815,7 +4821,15 @@
               <a:rPr lang="en-NL" dirty="0">
                 <a:latin typeface="Avenir Next" panose="020B0503020202020204" pitchFamily="34" charset="0"/>
               </a:rPr>
-              <a:t>Grid CE layer</a:t>
+              <a:t>Grid </a:t>
+            </a:r>
+          </a:p>
+          <a:p>
+            <a:r>
+              <a:rPr lang="en-NL" dirty="0">
+                <a:latin typeface="Avenir Next" panose="020B0503020202020204" pitchFamily="34" charset="0"/>
+              </a:rPr>
+              <a:t>Computing Environment </a:t>
             </a:r>
           </a:p>
         </p:txBody>

</xml_diff>